<commit_message>
* commit by jing
</commit_message>
<xml_diff>
--- a/Project Presentation/Java 3 Project Presentation.pptx
+++ b/Project Presentation/Java 3 Project Presentation.pptx
@@ -4,6 +4,9 @@
   <p:sldMasterIdLst>
     <p:sldMasterId id="2147483648" r:id="rId1"/>
   </p:sldMasterIdLst>
+  <p:handoutMasterIdLst>
+    <p:handoutMasterId r:id="rId14"/>
+  </p:handoutMasterIdLst>
   <p:sldIdLst>
     <p:sldId id="256" r:id="rId2"/>
     <p:sldId id="257" r:id="rId3"/>
@@ -19,7 +22,7 @@
     <p:sldId id="261" r:id="rId13"/>
   </p:sldIdLst>
   <p:sldSz cx="12192000" cy="6858000"/>
-  <p:notesSz cx="6858000" cy="9144000"/>
+  <p:notesSz cx="7102475" cy="9388475"/>
   <p:defaultTextStyle>
     <a:defPPr>
       <a:defRPr lang="en-US"/>
@@ -121,6 +124,171 @@
     </p:ext>
   </p:extLst>
 </p:presentation>
+</file>
+
+<file path=ppt/handoutMasters/handoutMaster1.xml><?xml version="1.0" encoding="utf-8"?>
+<p:handoutMaster xmlns:a="http://schemas.openxmlformats.org/drawingml/2006/main" xmlns:r="http://schemas.openxmlformats.org/officeDocument/2006/relationships" xmlns:p="http://schemas.openxmlformats.org/presentationml/2006/main">
+  <p:cSld>
+    <p:bg>
+      <p:bgRef idx="1001">
+        <a:schemeClr val="bg1"/>
+      </p:bgRef>
+    </p:bg>
+    <p:spTree>
+      <p:nvGrpSpPr>
+        <p:cNvPr id="1" name=""/>
+        <p:cNvGrpSpPr/>
+        <p:nvPr/>
+      </p:nvGrpSpPr>
+      <p:grpSpPr>
+        <a:xfrm>
+          <a:off x="0" y="0"/>
+          <a:ext cx="0" cy="0"/>
+          <a:chOff x="0" y="0"/>
+          <a:chExt cx="0" cy="0"/>
+        </a:xfrm>
+      </p:grpSpPr>
+      <p:sp>
+        <p:nvSpPr>
+          <p:cNvPr id="2" name="Header Placeholder 1"/>
+          <p:cNvSpPr>
+            <a:spLocks noGrp="1"/>
+          </p:cNvSpPr>
+          <p:nvPr>
+            <p:ph type="hdr" sz="quarter"/>
+          </p:nvPr>
+        </p:nvSpPr>
+        <p:spPr>
+          <a:xfrm>
+            <a:off x="0" y="0"/>
+            <a:ext cx="3077739" cy="471054"/>
+          </a:xfrm>
+          <a:prstGeom prst="rect">
+            <a:avLst/>
+          </a:prstGeom>
+        </p:spPr>
+        <p:txBody>
+          <a:bodyPr vert="horz" lIns="94229" tIns="47114" rIns="94229" bIns="47114" rtlCol="0"/>
+          <a:lstStyle>
+            <a:lvl1pPr algn="l">
+              <a:defRPr sz="1200"/>
+            </a:lvl1pPr>
+          </a:lstStyle>
+          <a:p>
+            <a:endParaRPr lang="en-CA"/>
+          </a:p>
+        </p:txBody>
+      </p:sp>
+      <p:sp>
+        <p:nvSpPr>
+          <p:cNvPr id="3" name="Date Placeholder 2"/>
+          <p:cNvSpPr>
+            <a:spLocks noGrp="1"/>
+          </p:cNvSpPr>
+          <p:nvPr>
+            <p:ph type="dt" sz="quarter" idx="1"/>
+          </p:nvPr>
+        </p:nvSpPr>
+        <p:spPr>
+          <a:xfrm>
+            <a:off x="4023092" y="0"/>
+            <a:ext cx="3077739" cy="471054"/>
+          </a:xfrm>
+          <a:prstGeom prst="rect">
+            <a:avLst/>
+          </a:prstGeom>
+        </p:spPr>
+        <p:txBody>
+          <a:bodyPr vert="horz" lIns="94229" tIns="47114" rIns="94229" bIns="47114" rtlCol="0"/>
+          <a:lstStyle>
+            <a:lvl1pPr algn="r">
+              <a:defRPr sz="1200"/>
+            </a:lvl1pPr>
+          </a:lstStyle>
+          <a:p>
+            <a:fld id="{4BF272A4-669E-4B8B-8CF2-5E24CD2F5AB6}" type="datetimeFigureOut">
+              <a:rPr lang="en-CA" smtClean="0"/>
+              <a:t>2018-03-07</a:t>
+            </a:fld>
+            <a:endParaRPr lang="en-CA"/>
+          </a:p>
+        </p:txBody>
+      </p:sp>
+      <p:sp>
+        <p:nvSpPr>
+          <p:cNvPr id="4" name="Footer Placeholder 3"/>
+          <p:cNvSpPr>
+            <a:spLocks noGrp="1"/>
+          </p:cNvSpPr>
+          <p:nvPr>
+            <p:ph type="ftr" sz="quarter" idx="2"/>
+          </p:nvPr>
+        </p:nvSpPr>
+        <p:spPr>
+          <a:xfrm>
+            <a:off x="0" y="8917422"/>
+            <a:ext cx="3077739" cy="471053"/>
+          </a:xfrm>
+          <a:prstGeom prst="rect">
+            <a:avLst/>
+          </a:prstGeom>
+        </p:spPr>
+        <p:txBody>
+          <a:bodyPr vert="horz" lIns="94229" tIns="47114" rIns="94229" bIns="47114" rtlCol="0" anchor="b"/>
+          <a:lstStyle>
+            <a:lvl1pPr algn="l">
+              <a:defRPr sz="1200"/>
+            </a:lvl1pPr>
+          </a:lstStyle>
+          <a:p>
+            <a:endParaRPr lang="en-CA"/>
+          </a:p>
+        </p:txBody>
+      </p:sp>
+      <p:sp>
+        <p:nvSpPr>
+          <p:cNvPr id="5" name="Slide Number Placeholder 4"/>
+          <p:cNvSpPr>
+            <a:spLocks noGrp="1"/>
+          </p:cNvSpPr>
+          <p:nvPr>
+            <p:ph type="sldNum" sz="quarter" idx="3"/>
+          </p:nvPr>
+        </p:nvSpPr>
+        <p:spPr>
+          <a:xfrm>
+            <a:off x="4023092" y="8917422"/>
+            <a:ext cx="3077739" cy="471053"/>
+          </a:xfrm>
+          <a:prstGeom prst="rect">
+            <a:avLst/>
+          </a:prstGeom>
+        </p:spPr>
+        <p:txBody>
+          <a:bodyPr vert="horz" lIns="94229" tIns="47114" rIns="94229" bIns="47114" rtlCol="0" anchor="b"/>
+          <a:lstStyle>
+            <a:lvl1pPr algn="r">
+              <a:defRPr sz="1200"/>
+            </a:lvl1pPr>
+          </a:lstStyle>
+          <a:p>
+            <a:fld id="{19268A88-B67A-455C-8770-20820519E901}" type="slidenum">
+              <a:rPr lang="en-CA" smtClean="0"/>
+              <a:t>‹#›</a:t>
+            </a:fld>
+            <a:endParaRPr lang="en-CA"/>
+          </a:p>
+        </p:txBody>
+      </p:sp>
+    </p:spTree>
+    <p:extLst>
+      <p:ext uri="{BB962C8B-B14F-4D97-AF65-F5344CB8AC3E}">
+        <p14:creationId xmlns:p14="http://schemas.microsoft.com/office/powerpoint/2010/main" val="375903303"/>
+      </p:ext>
+    </p:extLst>
+  </p:cSld>
+  <p:clrMap bg1="lt1" tx1="dk1" bg2="lt2" tx2="dk2" accent1="accent1" accent2="accent2" accent3="accent3" accent4="accent4" accent5="accent5" accent6="accent6" hlink="hlink" folHlink="folHlink"/>
+</p:handoutMaster>
 </file>
 
 <file path=ppt/slideLayouts/slideLayout1.xml><?xml version="1.0" encoding="utf-8"?>
@@ -7663,6 +7831,10 @@
               <a:rPr lang="en-US" sz="4400" dirty="0"/>
               <a:t>Java 3 Team Project Presentation</a:t>
             </a:r>
+            <a:r>
+              <a:rPr lang="en-US" sz="4000" dirty="0"/>
+              <a:t/>
+            </a:r>
             <a:br>
               <a:rPr lang="en-US" sz="4000" dirty="0"/>
             </a:br>
@@ -7726,6 +7898,13 @@
   <p:clrMapOvr>
     <a:masterClrMapping/>
   </p:clrMapOvr>
+  <p:timing>
+    <p:tnLst>
+      <p:par>
+        <p:cTn id="1" dur="indefinite" restart="never" nodeType="tmRoot"/>
+      </p:par>
+    </p:tnLst>
+  </p:timing>
 </p:sld>
 </file>
 
@@ -7864,7 +8043,7 @@
         </p:blipFill>
         <p:spPr>
           <a:xfrm>
-            <a:off x="6413507" y="2641880"/>
+            <a:off x="6413507" y="2696880"/>
             <a:ext cx="4762500" cy="733425"/>
           </a:xfrm>
           <a:prstGeom prst="rect">
@@ -7983,6 +8162,13 @@
   <p:clrMapOvr>
     <a:masterClrMapping/>
   </p:clrMapOvr>
+  <p:timing>
+    <p:tnLst>
+      <p:par>
+        <p:cTn id="1" dur="indefinite" restart="never" nodeType="tmRoot"/>
+      </p:par>
+    </p:tnLst>
+  </p:timing>
 </p:sld>
 </file>
 
@@ -8106,6 +8292,13 @@
   <p:clrMapOvr>
     <a:masterClrMapping/>
   </p:clrMapOvr>
+  <p:timing>
+    <p:tnLst>
+      <p:par>
+        <p:cTn id="1" dur="indefinite" restart="never" nodeType="tmRoot"/>
+      </p:par>
+    </p:tnLst>
+  </p:timing>
 </p:sld>
 </file>
 
@@ -8254,7 +8447,11 @@
             <a:noFill/>
           </a:ln>
           <a:effectLst>
-            <a:softEdge rad="112500"/>
+            <a:outerShdw blurRad="292100" dist="139700" dir="2700000" algn="tl" rotWithShape="0">
+              <a:srgbClr val="333333">
+                <a:alpha val="65000"/>
+              </a:srgbClr>
+            </a:outerShdw>
           </a:effectLst>
         </p:spPr>
       </p:pic>
@@ -8268,6 +8465,13 @@
   <p:clrMapOvr>
     <a:masterClrMapping/>
   </p:clrMapOvr>
+  <p:timing>
+    <p:tnLst>
+      <p:par>
+        <p:cTn id="1" dur="indefinite" restart="never" nodeType="tmRoot"/>
+      </p:par>
+    </p:tnLst>
+  </p:timing>
 </p:sld>
 </file>
 
@@ -8372,6 +8576,13 @@
   <p:clrMapOvr>
     <a:masterClrMapping/>
   </p:clrMapOvr>
+  <p:timing>
+    <p:tnLst>
+      <p:par>
+        <p:cTn id="1" dur="indefinite" restart="never" nodeType="tmRoot"/>
+      </p:par>
+    </p:tnLst>
+  </p:timing>
 </p:sld>
 </file>
 
@@ -8440,7 +8651,23 @@
             </a:pPr>
             <a:r>
               <a:rPr lang="en-US" dirty="0"/>
-              <a:t>	- Project management </a:t>
+              <a:t>	- </a:t>
+            </a:r>
+            <a:r>
+              <a:rPr lang="en-US" dirty="0" smtClean="0"/>
+              <a:t>Project </a:t>
+            </a:r>
+            <a:r>
+              <a:rPr lang="en-US" altLang="zh-CN" dirty="0" smtClean="0"/>
+              <a:t>/ Task</a:t>
+            </a:r>
+            <a:r>
+              <a:rPr lang="en-US" dirty="0" smtClean="0"/>
+              <a:t> </a:t>
+            </a:r>
+            <a:r>
+              <a:rPr lang="en-US" dirty="0"/>
+              <a:t>management </a:t>
             </a:r>
           </a:p>
           <a:p>
@@ -8449,12 +8676,17 @@
             </a:pPr>
             <a:r>
               <a:rPr lang="en-US" dirty="0"/>
-              <a:t>	- Risk control</a:t>
-            </a:r>
-          </a:p>
-          <a:p>
-            <a:r>
-              <a:rPr lang="en-US" dirty="0"/>
+              <a:t>	- </a:t>
+            </a:r>
+            <a:r>
+              <a:rPr lang="en-US" altLang="zh-CN" dirty="0" smtClean="0"/>
+              <a:t>Time management</a:t>
+            </a:r>
+            <a:endParaRPr lang="en-US" dirty="0" smtClean="0"/>
+          </a:p>
+          <a:p>
+            <a:r>
+              <a:rPr lang="en-US" dirty="0" smtClean="0"/>
               <a:t>Solved problems</a:t>
             </a:r>
           </a:p>
@@ -8503,8 +8735,657 @@
         </p:blipFill>
         <p:spPr>
           <a:xfrm>
-            <a:off x="5361794" y="2658892"/>
+            <a:off x="5457891" y="2858271"/>
             <a:ext cx="6142818" cy="3480930"/>
+          </a:xfrm>
+          <a:prstGeom prst="rect">
+            <a:avLst/>
+          </a:prstGeom>
+          <a:ln>
+            <a:noFill/>
+          </a:ln>
+          <a:effectLst>
+            <a:softEdge rad="112500"/>
+          </a:effectLst>
+        </p:spPr>
+      </p:pic>
+    </p:spTree>
+    <p:extLst>
+      <p:ext uri="{BB962C8B-B14F-4D97-AF65-F5344CB8AC3E}">
+        <p14:creationId xmlns:p14="http://schemas.microsoft.com/office/powerpoint/2010/main" val="3806817754"/>
+      </p:ext>
+    </p:extLst>
+  </p:cSld>
+  <p:clrMapOvr>
+    <a:masterClrMapping/>
+  </p:clrMapOvr>
+  <p:timing>
+    <p:tnLst>
+      <p:par>
+        <p:cTn id="1" dur="indefinite" restart="never" nodeType="tmRoot"/>
+      </p:par>
+    </p:tnLst>
+  </p:timing>
+</p:sld>
+</file>
+
+<file path=ppt/slides/slide4.xml><?xml version="1.0" encoding="utf-8"?>
+<p:sld xmlns:a="http://schemas.openxmlformats.org/drawingml/2006/main" xmlns:r="http://schemas.openxmlformats.org/officeDocument/2006/relationships" xmlns:p="http://schemas.openxmlformats.org/presentationml/2006/main">
+  <p:cSld>
+    <p:spTree>
+      <p:nvGrpSpPr>
+        <p:cNvPr id="1" name=""/>
+        <p:cNvGrpSpPr/>
+        <p:nvPr/>
+      </p:nvGrpSpPr>
+      <p:grpSpPr>
+        <a:xfrm>
+          <a:off x="0" y="0"/>
+          <a:ext cx="0" cy="0"/>
+          <a:chOff x="0" y="0"/>
+          <a:chExt cx="0" cy="0"/>
+        </a:xfrm>
+      </p:grpSpPr>
+      <p:sp>
+        <p:nvSpPr>
+          <p:cNvPr id="2" name="Title 1"/>
+          <p:cNvSpPr>
+            <a:spLocks noGrp="1"/>
+          </p:cNvSpPr>
+          <p:nvPr>
+            <p:ph type="title"/>
+          </p:nvPr>
+        </p:nvSpPr>
+        <p:spPr/>
+        <p:txBody>
+          <a:bodyPr/>
+          <a:lstStyle/>
+          <a:p>
+            <a:r>
+              <a:rPr lang="en-US" dirty="0"/>
+              <a:t>Solution Overview 1/2</a:t>
+            </a:r>
+          </a:p>
+        </p:txBody>
+      </p:sp>
+      <p:pic>
+        <p:nvPicPr>
+          <p:cNvPr id="4" name="Picture 3"/>
+          <p:cNvPicPr>
+            <a:picLocks noChangeAspect="1"/>
+          </p:cNvPicPr>
+          <p:nvPr/>
+        </p:nvPicPr>
+        <p:blipFill>
+          <a:blip r:embed="rId2"/>
+          <a:stretch>
+            <a:fillRect/>
+          </a:stretch>
+        </p:blipFill>
+        <p:spPr>
+          <a:xfrm>
+            <a:off x="3375144" y="1327503"/>
+            <a:ext cx="6657400" cy="3688874"/>
+          </a:xfrm>
+          <a:prstGeom prst="rect">
+            <a:avLst/>
+          </a:prstGeom>
+          <a:ln>
+            <a:noFill/>
+          </a:ln>
+          <a:effectLst>
+            <a:outerShdw blurRad="292100" dist="139700" dir="2700000" algn="tl" rotWithShape="0">
+              <a:srgbClr val="333333">
+                <a:alpha val="65000"/>
+              </a:srgbClr>
+            </a:outerShdw>
+          </a:effectLst>
+        </p:spPr>
+      </p:pic>
+      <p:pic>
+        <p:nvPicPr>
+          <p:cNvPr id="9" name="Picture 8"/>
+          <p:cNvPicPr>
+            <a:picLocks noChangeAspect="1"/>
+          </p:cNvPicPr>
+          <p:nvPr/>
+        </p:nvPicPr>
+        <p:blipFill>
+          <a:blip r:embed="rId3"/>
+          <a:stretch>
+            <a:fillRect/>
+          </a:stretch>
+        </p:blipFill>
+        <p:spPr>
+          <a:xfrm>
+            <a:off x="319068" y="1327503"/>
+            <a:ext cx="2073348" cy="1396740"/>
+          </a:xfrm>
+          <a:prstGeom prst="rect">
+            <a:avLst/>
+          </a:prstGeom>
+          <a:ln>
+            <a:noFill/>
+          </a:ln>
+          <a:effectLst>
+            <a:outerShdw blurRad="292100" dist="139700" dir="2700000" algn="tl" rotWithShape="0">
+              <a:srgbClr val="333333">
+                <a:alpha val="65000"/>
+              </a:srgbClr>
+            </a:outerShdw>
+          </a:effectLst>
+        </p:spPr>
+      </p:pic>
+      <p:pic>
+        <p:nvPicPr>
+          <p:cNvPr id="10" name="Picture 9"/>
+          <p:cNvPicPr>
+            <a:picLocks noChangeAspect="1"/>
+          </p:cNvPicPr>
+          <p:nvPr/>
+        </p:nvPicPr>
+        <p:blipFill>
+          <a:blip r:embed="rId4"/>
+          <a:stretch>
+            <a:fillRect/>
+          </a:stretch>
+        </p:blipFill>
+        <p:spPr>
+          <a:xfrm>
+            <a:off x="191444" y="3709531"/>
+            <a:ext cx="2249241" cy="3118851"/>
+          </a:xfrm>
+          <a:prstGeom prst="rect">
+            <a:avLst/>
+          </a:prstGeom>
+          <a:ln>
+            <a:noFill/>
+          </a:ln>
+          <a:effectLst>
+            <a:outerShdw blurRad="292100" dist="139700" dir="2700000" algn="tl" rotWithShape="0">
+              <a:srgbClr val="333333">
+                <a:alpha val="65000"/>
+              </a:srgbClr>
+            </a:outerShdw>
+          </a:effectLst>
+        </p:spPr>
+      </p:pic>
+      <p:sp>
+        <p:nvSpPr>
+          <p:cNvPr id="11" name="Bent-Up Arrow 10"/>
+          <p:cNvSpPr/>
+          <p:nvPr/>
+        </p:nvSpPr>
+        <p:spPr>
+          <a:xfrm flipV="1">
+            <a:off x="9890212" y="2194274"/>
+            <a:ext cx="618762" cy="1122356"/>
+          </a:xfrm>
+          <a:prstGeom prst="bentUpArrow">
+            <a:avLst/>
+          </a:prstGeom>
+        </p:spPr>
+        <p:style>
+          <a:lnRef idx="2">
+            <a:schemeClr val="accent1">
+              <a:shade val="50000"/>
+            </a:schemeClr>
+          </a:lnRef>
+          <a:fillRef idx="1">
+            <a:schemeClr val="accent1"/>
+          </a:fillRef>
+          <a:effectRef idx="0">
+            <a:schemeClr val="accent1"/>
+          </a:effectRef>
+          <a:fontRef idx="minor">
+            <a:schemeClr val="lt1"/>
+          </a:fontRef>
+        </p:style>
+        <p:txBody>
+          <a:bodyPr rtlCol="0" anchor="ctr"/>
+          <a:lstStyle/>
+          <a:p>
+            <a:pPr algn="ctr"/>
+            <a:endParaRPr lang="en-US"/>
+          </a:p>
+        </p:txBody>
+      </p:sp>
+      <p:sp>
+        <p:nvSpPr>
+          <p:cNvPr id="13" name="Down Arrow 12"/>
+          <p:cNvSpPr/>
+          <p:nvPr/>
+        </p:nvSpPr>
+        <p:spPr>
+          <a:xfrm>
+            <a:off x="971940" y="2913397"/>
+            <a:ext cx="242521" cy="642339"/>
+          </a:xfrm>
+          <a:prstGeom prst="downArrow">
+            <a:avLst/>
+          </a:prstGeom>
+        </p:spPr>
+        <p:style>
+          <a:lnRef idx="2">
+            <a:schemeClr val="accent1">
+              <a:shade val="50000"/>
+            </a:schemeClr>
+          </a:lnRef>
+          <a:fillRef idx="1">
+            <a:schemeClr val="accent1"/>
+          </a:fillRef>
+          <a:effectRef idx="0">
+            <a:schemeClr val="accent1"/>
+          </a:effectRef>
+          <a:fontRef idx="minor">
+            <a:schemeClr val="lt1"/>
+          </a:fontRef>
+        </p:style>
+        <p:txBody>
+          <a:bodyPr rtlCol="0" anchor="ctr"/>
+          <a:lstStyle/>
+          <a:p>
+            <a:pPr algn="ctr"/>
+            <a:endParaRPr lang="en-US"/>
+          </a:p>
+        </p:txBody>
+      </p:sp>
+      <p:sp>
+        <p:nvSpPr>
+          <p:cNvPr id="14" name="Right Arrow 13"/>
+          <p:cNvSpPr/>
+          <p:nvPr/>
+        </p:nvSpPr>
+        <p:spPr>
+          <a:xfrm>
+            <a:off x="2488956" y="1795304"/>
+            <a:ext cx="886188" cy="255391"/>
+          </a:xfrm>
+          <a:prstGeom prst="rightArrow">
+            <a:avLst/>
+          </a:prstGeom>
+        </p:spPr>
+        <p:style>
+          <a:lnRef idx="2">
+            <a:schemeClr val="accent1">
+              <a:shade val="50000"/>
+            </a:schemeClr>
+          </a:lnRef>
+          <a:fillRef idx="1">
+            <a:schemeClr val="accent1"/>
+          </a:fillRef>
+          <a:effectRef idx="0">
+            <a:schemeClr val="accent1"/>
+          </a:effectRef>
+          <a:fontRef idx="minor">
+            <a:schemeClr val="lt1"/>
+          </a:fontRef>
+        </p:style>
+        <p:txBody>
+          <a:bodyPr rtlCol="0" anchor="ctr"/>
+          <a:lstStyle/>
+          <a:p>
+            <a:pPr algn="ctr"/>
+            <a:endParaRPr lang="en-US"/>
+          </a:p>
+        </p:txBody>
+      </p:sp>
+      <p:sp>
+        <p:nvSpPr>
+          <p:cNvPr id="3" name="文本框 2">
+            <a:extLst>
+              <a:ext uri="{FF2B5EF4-FFF2-40B4-BE49-F238E27FC236}">
+                <a16:creationId xmlns:a16="http://schemas.microsoft.com/office/drawing/2014/main" xmlns="" id="{42245E35-37E5-4284-9FD4-CA161B576E0C}"/>
+              </a:ext>
+            </a:extLst>
+          </p:cNvPr>
+          <p:cNvSpPr txBox="1"/>
+          <p:nvPr/>
+        </p:nvSpPr>
+        <p:spPr>
+          <a:xfrm>
+            <a:off x="10032544" y="3267699"/>
+            <a:ext cx="1989887" cy="369332"/>
+          </a:xfrm>
+          <a:prstGeom prst="rect">
+            <a:avLst/>
+          </a:prstGeom>
+          <a:noFill/>
+        </p:spPr>
+        <p:txBody>
+          <a:bodyPr wrap="square" rtlCol="0">
+            <a:spAutoFit/>
+          </a:bodyPr>
+          <a:lstStyle/>
+          <a:p>
+            <a:r>
+              <a:rPr lang="en-US" altLang="zh-CN" dirty="0">
+                <a:solidFill>
+                  <a:schemeClr val="tx1">
+                    <a:lumMod val="85000"/>
+                    <a:lumOff val="15000"/>
+                  </a:schemeClr>
+                </a:solidFill>
+                <a:latin typeface="+mj-lt"/>
+                <a:ea typeface="+mj-ea"/>
+                <a:cs typeface="+mj-cs"/>
+              </a:rPr>
+              <a:t>Export to Report</a:t>
+            </a:r>
+            <a:endParaRPr lang="zh-CN" altLang="en-US" dirty="0">
+              <a:solidFill>
+                <a:schemeClr val="tx1">
+                  <a:lumMod val="85000"/>
+                  <a:lumOff val="15000"/>
+                </a:schemeClr>
+              </a:solidFill>
+              <a:latin typeface="+mj-lt"/>
+              <a:ea typeface="+mj-ea"/>
+              <a:cs typeface="+mj-cs"/>
+            </a:endParaRPr>
+          </a:p>
+        </p:txBody>
+      </p:sp>
+      <p:sp>
+        <p:nvSpPr>
+          <p:cNvPr id="12" name="Right Arrow 13">
+            <a:extLst>
+              <a:ext uri="{FF2B5EF4-FFF2-40B4-BE49-F238E27FC236}">
+                <a16:creationId xmlns:a16="http://schemas.microsoft.com/office/drawing/2014/main" xmlns="" id="{CBC58416-9865-43A8-B9DE-09E0A7971810}"/>
+              </a:ext>
+            </a:extLst>
+          </p:cNvPr>
+          <p:cNvSpPr/>
+          <p:nvPr/>
+        </p:nvSpPr>
+        <p:spPr>
+          <a:xfrm rot="10800000">
+            <a:off x="2440686" y="2196390"/>
+            <a:ext cx="886188" cy="255390"/>
+          </a:xfrm>
+          <a:prstGeom prst="rightArrow">
+            <a:avLst/>
+          </a:prstGeom>
+        </p:spPr>
+        <p:style>
+          <a:lnRef idx="2">
+            <a:schemeClr val="accent1">
+              <a:shade val="50000"/>
+            </a:schemeClr>
+          </a:lnRef>
+          <a:fillRef idx="1">
+            <a:schemeClr val="accent1"/>
+          </a:fillRef>
+          <a:effectRef idx="0">
+            <a:schemeClr val="accent1"/>
+          </a:effectRef>
+          <a:fontRef idx="minor">
+            <a:schemeClr val="lt1"/>
+          </a:fontRef>
+        </p:style>
+        <p:txBody>
+          <a:bodyPr rtlCol="0" anchor="ctr"/>
+          <a:lstStyle/>
+          <a:p>
+            <a:pPr algn="ctr"/>
+            <a:endParaRPr lang="en-US"/>
+          </a:p>
+        </p:txBody>
+      </p:sp>
+      <p:sp>
+        <p:nvSpPr>
+          <p:cNvPr id="16" name="文本框 15">
+            <a:extLst>
+              <a:ext uri="{FF2B5EF4-FFF2-40B4-BE49-F238E27FC236}">
+                <a16:creationId xmlns:a16="http://schemas.microsoft.com/office/drawing/2014/main" xmlns="" id="{5F05C8E5-84EA-4AC4-B515-98FD4A078EB6}"/>
+              </a:ext>
+            </a:extLst>
+          </p:cNvPr>
+          <p:cNvSpPr txBox="1"/>
+          <p:nvPr/>
+        </p:nvSpPr>
+        <p:spPr>
+          <a:xfrm>
+            <a:off x="2512269" y="1353125"/>
+            <a:ext cx="766335" cy="369332"/>
+          </a:xfrm>
+          <a:prstGeom prst="rect">
+            <a:avLst/>
+          </a:prstGeom>
+          <a:noFill/>
+        </p:spPr>
+        <p:txBody>
+          <a:bodyPr wrap="square" rtlCol="0">
+            <a:spAutoFit/>
+          </a:bodyPr>
+          <a:lstStyle/>
+          <a:p>
+            <a:r>
+              <a:rPr lang="en-US" altLang="zh-CN" dirty="0">
+                <a:solidFill>
+                  <a:schemeClr val="tx1">
+                    <a:lumMod val="85000"/>
+                    <a:lumOff val="15000"/>
+                  </a:schemeClr>
+                </a:solidFill>
+                <a:latin typeface="+mj-lt"/>
+                <a:ea typeface="+mj-ea"/>
+                <a:cs typeface="+mj-cs"/>
+              </a:rPr>
+              <a:t>login</a:t>
+            </a:r>
+            <a:endParaRPr lang="zh-CN" altLang="en-US" dirty="0">
+              <a:solidFill>
+                <a:schemeClr val="tx1">
+                  <a:lumMod val="85000"/>
+                  <a:lumOff val="15000"/>
+                </a:schemeClr>
+              </a:solidFill>
+              <a:latin typeface="+mj-lt"/>
+              <a:ea typeface="+mj-ea"/>
+              <a:cs typeface="+mj-cs"/>
+            </a:endParaRPr>
+          </a:p>
+        </p:txBody>
+      </p:sp>
+      <p:sp>
+        <p:nvSpPr>
+          <p:cNvPr id="17" name="文本框 16">
+            <a:extLst>
+              <a:ext uri="{FF2B5EF4-FFF2-40B4-BE49-F238E27FC236}">
+                <a16:creationId xmlns:a16="http://schemas.microsoft.com/office/drawing/2014/main" xmlns="" id="{87B88508-1B89-44D7-ACAB-B0830A144707}"/>
+              </a:ext>
+            </a:extLst>
+          </p:cNvPr>
+          <p:cNvSpPr txBox="1"/>
+          <p:nvPr/>
+        </p:nvSpPr>
+        <p:spPr>
+          <a:xfrm>
+            <a:off x="2392416" y="2386120"/>
+            <a:ext cx="934458" cy="369332"/>
+          </a:xfrm>
+          <a:prstGeom prst="rect">
+            <a:avLst/>
+          </a:prstGeom>
+          <a:noFill/>
+        </p:spPr>
+        <p:txBody>
+          <a:bodyPr wrap="square" rtlCol="0">
+            <a:spAutoFit/>
+          </a:bodyPr>
+          <a:lstStyle/>
+          <a:p>
+            <a:r>
+              <a:rPr lang="en-US" altLang="zh-CN" dirty="0">
+                <a:solidFill>
+                  <a:schemeClr val="tx1">
+                    <a:lumMod val="85000"/>
+                    <a:lumOff val="15000"/>
+                  </a:schemeClr>
+                </a:solidFill>
+                <a:latin typeface="+mj-lt"/>
+                <a:ea typeface="+mj-ea"/>
+                <a:cs typeface="+mj-cs"/>
+              </a:rPr>
+              <a:t>logout</a:t>
+            </a:r>
+            <a:endParaRPr lang="zh-CN" altLang="en-US" dirty="0">
+              <a:solidFill>
+                <a:schemeClr val="tx1">
+                  <a:lumMod val="85000"/>
+                  <a:lumOff val="15000"/>
+                </a:schemeClr>
+              </a:solidFill>
+              <a:latin typeface="+mj-lt"/>
+              <a:ea typeface="+mj-ea"/>
+              <a:cs typeface="+mj-cs"/>
+            </a:endParaRPr>
+          </a:p>
+        </p:txBody>
+      </p:sp>
+      <p:sp>
+        <p:nvSpPr>
+          <p:cNvPr id="5" name="文本框 4">
+            <a:extLst>
+              <a:ext uri="{FF2B5EF4-FFF2-40B4-BE49-F238E27FC236}">
+                <a16:creationId xmlns:a16="http://schemas.microsoft.com/office/drawing/2014/main" xmlns="" id="{A0E56FF2-C0D5-4A3B-A3BA-24C089D8D780}"/>
+              </a:ext>
+            </a:extLst>
+          </p:cNvPr>
+          <p:cNvSpPr txBox="1"/>
+          <p:nvPr/>
+        </p:nvSpPr>
+        <p:spPr>
+          <a:xfrm>
+            <a:off x="585868" y="2796249"/>
+            <a:ext cx="461665" cy="942900"/>
+          </a:xfrm>
+          <a:prstGeom prst="rect">
+            <a:avLst/>
+          </a:prstGeom>
+          <a:noFill/>
+        </p:spPr>
+        <p:txBody>
+          <a:bodyPr vert="eaVert" wrap="square" rtlCol="0">
+            <a:spAutoFit/>
+          </a:bodyPr>
+          <a:lstStyle/>
+          <a:p>
+            <a:r>
+              <a:rPr lang="en-US" altLang="zh-CN" dirty="0"/>
+              <a:t>register</a:t>
+            </a:r>
+            <a:endParaRPr lang="zh-CN" altLang="en-US" dirty="0"/>
+          </a:p>
+        </p:txBody>
+      </p:sp>
+      <p:sp>
+        <p:nvSpPr>
+          <p:cNvPr id="18" name="Down Arrow 12">
+            <a:extLst>
+              <a:ext uri="{FF2B5EF4-FFF2-40B4-BE49-F238E27FC236}">
+                <a16:creationId xmlns:a16="http://schemas.microsoft.com/office/drawing/2014/main" xmlns="" id="{C9F0D95C-374D-4BD0-B2F3-A3E02D088EAF}"/>
+              </a:ext>
+            </a:extLst>
+          </p:cNvPr>
+          <p:cNvSpPr/>
+          <p:nvPr/>
+        </p:nvSpPr>
+        <p:spPr>
+          <a:xfrm rot="10800000">
+            <a:off x="1355742" y="2916555"/>
+            <a:ext cx="242521" cy="642339"/>
+          </a:xfrm>
+          <a:prstGeom prst="downArrow">
+            <a:avLst/>
+          </a:prstGeom>
+        </p:spPr>
+        <p:style>
+          <a:lnRef idx="2">
+            <a:schemeClr val="accent1">
+              <a:shade val="50000"/>
+            </a:schemeClr>
+          </a:lnRef>
+          <a:fillRef idx="1">
+            <a:schemeClr val="accent1"/>
+          </a:fillRef>
+          <a:effectRef idx="0">
+            <a:schemeClr val="accent1"/>
+          </a:effectRef>
+          <a:fontRef idx="minor">
+            <a:schemeClr val="lt1"/>
+          </a:fontRef>
+        </p:style>
+        <p:txBody>
+          <a:bodyPr rtlCol="0" anchor="ctr"/>
+          <a:lstStyle/>
+          <a:p>
+            <a:pPr algn="ctr"/>
+            <a:endParaRPr lang="en-US"/>
+          </a:p>
+        </p:txBody>
+      </p:sp>
+      <p:sp>
+        <p:nvSpPr>
+          <p:cNvPr id="19" name="文本框 18">
+            <a:extLst>
+              <a:ext uri="{FF2B5EF4-FFF2-40B4-BE49-F238E27FC236}">
+                <a16:creationId xmlns:a16="http://schemas.microsoft.com/office/drawing/2014/main" xmlns="" id="{29F1A42A-9DD7-478A-9C76-78CCD0BEB495}"/>
+              </a:ext>
+            </a:extLst>
+          </p:cNvPr>
+          <p:cNvSpPr txBox="1"/>
+          <p:nvPr/>
+        </p:nvSpPr>
+        <p:spPr>
+          <a:xfrm rot="10800000">
+            <a:off x="1548471" y="2649482"/>
+            <a:ext cx="461665" cy="942900"/>
+          </a:xfrm>
+          <a:prstGeom prst="rect">
+            <a:avLst/>
+          </a:prstGeom>
+          <a:noFill/>
+        </p:spPr>
+        <p:txBody>
+          <a:bodyPr vert="eaVert" wrap="square" rtlCol="0">
+            <a:spAutoFit/>
+          </a:bodyPr>
+          <a:lstStyle/>
+          <a:p>
+            <a:r>
+              <a:rPr lang="en-US" altLang="zh-CN" dirty="0"/>
+              <a:t>Done</a:t>
+            </a:r>
+            <a:endParaRPr lang="zh-CN" altLang="en-US" dirty="0"/>
+          </a:p>
+        </p:txBody>
+      </p:sp>
+      <p:pic>
+        <p:nvPicPr>
+          <p:cNvPr id="8" name="图片 7">
+            <a:extLst>
+              <a:ext uri="{FF2B5EF4-FFF2-40B4-BE49-F238E27FC236}">
+                <a16:creationId xmlns:a16="http://schemas.microsoft.com/office/drawing/2014/main" xmlns="" id="{53BE92F3-4D47-4386-993F-3B850EE1B6F2}"/>
+              </a:ext>
+            </a:extLst>
+          </p:cNvPr>
+          <p:cNvPicPr>
+            <a:picLocks noChangeAspect="1"/>
+          </p:cNvPicPr>
+          <p:nvPr/>
+        </p:nvPicPr>
+        <p:blipFill>
+          <a:blip r:embed="rId5"/>
+          <a:stretch>
+            <a:fillRect/>
+          </a:stretch>
+        </p:blipFill>
+        <p:spPr>
+          <a:xfrm>
+            <a:off x="8114182" y="3155677"/>
+            <a:ext cx="3836723" cy="3594647"/>
           </a:xfrm>
           <a:prstGeom prst="roundRect">
             <a:avLst>
@@ -8538,666 +9419,6 @@
     </p:spTree>
     <p:extLst>
       <p:ext uri="{BB962C8B-B14F-4D97-AF65-F5344CB8AC3E}">
-        <p14:creationId xmlns:p14="http://schemas.microsoft.com/office/powerpoint/2010/main" val="3806817754"/>
-      </p:ext>
-    </p:extLst>
-  </p:cSld>
-  <p:clrMapOvr>
-    <a:masterClrMapping/>
-  </p:clrMapOvr>
-</p:sld>
-</file>
-
-<file path=ppt/slides/slide4.xml><?xml version="1.0" encoding="utf-8"?>
-<p:sld xmlns:a="http://schemas.openxmlformats.org/drawingml/2006/main" xmlns:r="http://schemas.openxmlformats.org/officeDocument/2006/relationships" xmlns:p="http://schemas.openxmlformats.org/presentationml/2006/main">
-  <p:cSld>
-    <p:spTree>
-      <p:nvGrpSpPr>
-        <p:cNvPr id="1" name=""/>
-        <p:cNvGrpSpPr/>
-        <p:nvPr/>
-      </p:nvGrpSpPr>
-      <p:grpSpPr>
-        <a:xfrm>
-          <a:off x="0" y="0"/>
-          <a:ext cx="0" cy="0"/>
-          <a:chOff x="0" y="0"/>
-          <a:chExt cx="0" cy="0"/>
-        </a:xfrm>
-      </p:grpSpPr>
-      <p:sp>
-        <p:nvSpPr>
-          <p:cNvPr id="2" name="Title 1"/>
-          <p:cNvSpPr>
-            <a:spLocks noGrp="1"/>
-          </p:cNvSpPr>
-          <p:nvPr>
-            <p:ph type="title"/>
-          </p:nvPr>
-        </p:nvSpPr>
-        <p:spPr/>
-        <p:txBody>
-          <a:bodyPr/>
-          <a:lstStyle/>
-          <a:p>
-            <a:r>
-              <a:rPr lang="en-US" dirty="0"/>
-              <a:t>Solution Overview 1/2</a:t>
-            </a:r>
-          </a:p>
-        </p:txBody>
-      </p:sp>
-      <p:pic>
-        <p:nvPicPr>
-          <p:cNvPr id="4" name="Picture 3"/>
-          <p:cNvPicPr>
-            <a:picLocks noChangeAspect="1"/>
-          </p:cNvPicPr>
-          <p:nvPr/>
-        </p:nvPicPr>
-        <p:blipFill>
-          <a:blip r:embed="rId2"/>
-          <a:stretch>
-            <a:fillRect/>
-          </a:stretch>
-        </p:blipFill>
-        <p:spPr>
-          <a:xfrm>
-            <a:off x="3375144" y="1327503"/>
-            <a:ext cx="6657400" cy="3688874"/>
-          </a:xfrm>
-          <a:prstGeom prst="rect">
-            <a:avLst/>
-          </a:prstGeom>
-          <a:ln>
-            <a:noFill/>
-          </a:ln>
-          <a:effectLst>
-            <a:outerShdw blurRad="292100" dist="139700" dir="2700000" algn="tl" rotWithShape="0">
-              <a:srgbClr val="333333">
-                <a:alpha val="65000"/>
-              </a:srgbClr>
-            </a:outerShdw>
-          </a:effectLst>
-        </p:spPr>
-      </p:pic>
-      <p:pic>
-        <p:nvPicPr>
-          <p:cNvPr id="9" name="Picture 8"/>
-          <p:cNvPicPr>
-            <a:picLocks noChangeAspect="1"/>
-          </p:cNvPicPr>
-          <p:nvPr/>
-        </p:nvPicPr>
-        <p:blipFill>
-          <a:blip r:embed="rId3"/>
-          <a:stretch>
-            <a:fillRect/>
-          </a:stretch>
-        </p:blipFill>
-        <p:spPr>
-          <a:xfrm>
-            <a:off x="319068" y="1327503"/>
-            <a:ext cx="2073348" cy="1396740"/>
-          </a:xfrm>
-          <a:prstGeom prst="rect">
-            <a:avLst/>
-          </a:prstGeom>
-          <a:ln>
-            <a:noFill/>
-          </a:ln>
-          <a:effectLst>
-            <a:outerShdw blurRad="292100" dist="139700" dir="2700000" algn="tl" rotWithShape="0">
-              <a:srgbClr val="333333">
-                <a:alpha val="65000"/>
-              </a:srgbClr>
-            </a:outerShdw>
-          </a:effectLst>
-        </p:spPr>
-      </p:pic>
-      <p:pic>
-        <p:nvPicPr>
-          <p:cNvPr id="10" name="Picture 9"/>
-          <p:cNvPicPr>
-            <a:picLocks noChangeAspect="1"/>
-          </p:cNvPicPr>
-          <p:nvPr/>
-        </p:nvPicPr>
-        <p:blipFill>
-          <a:blip r:embed="rId4"/>
-          <a:stretch>
-            <a:fillRect/>
-          </a:stretch>
-        </p:blipFill>
-        <p:spPr>
-          <a:xfrm>
-            <a:off x="191444" y="3709531"/>
-            <a:ext cx="2249241" cy="3118851"/>
-          </a:xfrm>
-          <a:prstGeom prst="rect">
-            <a:avLst/>
-          </a:prstGeom>
-          <a:ln>
-            <a:noFill/>
-          </a:ln>
-          <a:effectLst>
-            <a:outerShdw blurRad="292100" dist="139700" dir="2700000" algn="tl" rotWithShape="0">
-              <a:srgbClr val="333333">
-                <a:alpha val="65000"/>
-              </a:srgbClr>
-            </a:outerShdw>
-          </a:effectLst>
-        </p:spPr>
-      </p:pic>
-      <p:sp>
-        <p:nvSpPr>
-          <p:cNvPr id="11" name="Bent-Up Arrow 10"/>
-          <p:cNvSpPr/>
-          <p:nvPr/>
-        </p:nvSpPr>
-        <p:spPr>
-          <a:xfrm flipV="1">
-            <a:off x="9890212" y="2194274"/>
-            <a:ext cx="618762" cy="1122356"/>
-          </a:xfrm>
-          <a:prstGeom prst="bentUpArrow">
-            <a:avLst/>
-          </a:prstGeom>
-        </p:spPr>
-        <p:style>
-          <a:lnRef idx="2">
-            <a:schemeClr val="accent1">
-              <a:shade val="50000"/>
-            </a:schemeClr>
-          </a:lnRef>
-          <a:fillRef idx="1">
-            <a:schemeClr val="accent1"/>
-          </a:fillRef>
-          <a:effectRef idx="0">
-            <a:schemeClr val="accent1"/>
-          </a:effectRef>
-          <a:fontRef idx="minor">
-            <a:schemeClr val="lt1"/>
-          </a:fontRef>
-        </p:style>
-        <p:txBody>
-          <a:bodyPr rtlCol="0" anchor="ctr"/>
-          <a:lstStyle/>
-          <a:p>
-            <a:pPr algn="ctr"/>
-            <a:endParaRPr lang="en-US"/>
-          </a:p>
-        </p:txBody>
-      </p:sp>
-      <p:sp>
-        <p:nvSpPr>
-          <p:cNvPr id="13" name="Down Arrow 12"/>
-          <p:cNvSpPr/>
-          <p:nvPr/>
-        </p:nvSpPr>
-        <p:spPr>
-          <a:xfrm>
-            <a:off x="971940" y="2913397"/>
-            <a:ext cx="242521" cy="642339"/>
-          </a:xfrm>
-          <a:prstGeom prst="downArrow">
-            <a:avLst/>
-          </a:prstGeom>
-        </p:spPr>
-        <p:style>
-          <a:lnRef idx="2">
-            <a:schemeClr val="accent1">
-              <a:shade val="50000"/>
-            </a:schemeClr>
-          </a:lnRef>
-          <a:fillRef idx="1">
-            <a:schemeClr val="accent1"/>
-          </a:fillRef>
-          <a:effectRef idx="0">
-            <a:schemeClr val="accent1"/>
-          </a:effectRef>
-          <a:fontRef idx="minor">
-            <a:schemeClr val="lt1"/>
-          </a:fontRef>
-        </p:style>
-        <p:txBody>
-          <a:bodyPr rtlCol="0" anchor="ctr"/>
-          <a:lstStyle/>
-          <a:p>
-            <a:pPr algn="ctr"/>
-            <a:endParaRPr lang="en-US"/>
-          </a:p>
-        </p:txBody>
-      </p:sp>
-      <p:sp>
-        <p:nvSpPr>
-          <p:cNvPr id="14" name="Right Arrow 13"/>
-          <p:cNvSpPr/>
-          <p:nvPr/>
-        </p:nvSpPr>
-        <p:spPr>
-          <a:xfrm>
-            <a:off x="2488956" y="1795304"/>
-            <a:ext cx="886188" cy="255391"/>
-          </a:xfrm>
-          <a:prstGeom prst="rightArrow">
-            <a:avLst/>
-          </a:prstGeom>
-        </p:spPr>
-        <p:style>
-          <a:lnRef idx="2">
-            <a:schemeClr val="accent1">
-              <a:shade val="50000"/>
-            </a:schemeClr>
-          </a:lnRef>
-          <a:fillRef idx="1">
-            <a:schemeClr val="accent1"/>
-          </a:fillRef>
-          <a:effectRef idx="0">
-            <a:schemeClr val="accent1"/>
-          </a:effectRef>
-          <a:fontRef idx="minor">
-            <a:schemeClr val="lt1"/>
-          </a:fontRef>
-        </p:style>
-        <p:txBody>
-          <a:bodyPr rtlCol="0" anchor="ctr"/>
-          <a:lstStyle/>
-          <a:p>
-            <a:pPr algn="ctr"/>
-            <a:endParaRPr lang="en-US"/>
-          </a:p>
-        </p:txBody>
-      </p:sp>
-      <p:sp>
-        <p:nvSpPr>
-          <p:cNvPr id="3" name="文本框 2">
-            <a:extLst>
-              <a:ext uri="{FF2B5EF4-FFF2-40B4-BE49-F238E27FC236}">
-                <a16:creationId xmlns:a16="http://schemas.microsoft.com/office/drawing/2014/main" id="{42245E35-37E5-4284-9FD4-CA161B576E0C}"/>
-              </a:ext>
-            </a:extLst>
-          </p:cNvPr>
-          <p:cNvSpPr txBox="1"/>
-          <p:nvPr/>
-        </p:nvSpPr>
-        <p:spPr>
-          <a:xfrm>
-            <a:off x="10032544" y="3267699"/>
-            <a:ext cx="1989887" cy="369332"/>
-          </a:xfrm>
-          <a:prstGeom prst="rect">
-            <a:avLst/>
-          </a:prstGeom>
-          <a:noFill/>
-        </p:spPr>
-        <p:txBody>
-          <a:bodyPr wrap="square" rtlCol="0">
-            <a:spAutoFit/>
-          </a:bodyPr>
-          <a:lstStyle/>
-          <a:p>
-            <a:r>
-              <a:rPr lang="en-US" altLang="zh-CN" dirty="0">
-                <a:solidFill>
-                  <a:schemeClr val="tx1">
-                    <a:lumMod val="85000"/>
-                    <a:lumOff val="15000"/>
-                  </a:schemeClr>
-                </a:solidFill>
-                <a:latin typeface="+mj-lt"/>
-                <a:ea typeface="+mj-ea"/>
-                <a:cs typeface="+mj-cs"/>
-              </a:rPr>
-              <a:t>Export to Report</a:t>
-            </a:r>
-            <a:endParaRPr lang="zh-CN" altLang="en-US" dirty="0">
-              <a:solidFill>
-                <a:schemeClr val="tx1">
-                  <a:lumMod val="85000"/>
-                  <a:lumOff val="15000"/>
-                </a:schemeClr>
-              </a:solidFill>
-              <a:latin typeface="+mj-lt"/>
-              <a:ea typeface="+mj-ea"/>
-              <a:cs typeface="+mj-cs"/>
-            </a:endParaRPr>
-          </a:p>
-        </p:txBody>
-      </p:sp>
-      <p:sp>
-        <p:nvSpPr>
-          <p:cNvPr id="12" name="Right Arrow 13">
-            <a:extLst>
-              <a:ext uri="{FF2B5EF4-FFF2-40B4-BE49-F238E27FC236}">
-                <a16:creationId xmlns:a16="http://schemas.microsoft.com/office/drawing/2014/main" id="{CBC58416-9865-43A8-B9DE-09E0A7971810}"/>
-              </a:ext>
-            </a:extLst>
-          </p:cNvPr>
-          <p:cNvSpPr/>
-          <p:nvPr/>
-        </p:nvSpPr>
-        <p:spPr>
-          <a:xfrm rot="10800000">
-            <a:off x="2440686" y="2196390"/>
-            <a:ext cx="886188" cy="255390"/>
-          </a:xfrm>
-          <a:prstGeom prst="rightArrow">
-            <a:avLst/>
-          </a:prstGeom>
-        </p:spPr>
-        <p:style>
-          <a:lnRef idx="2">
-            <a:schemeClr val="accent1">
-              <a:shade val="50000"/>
-            </a:schemeClr>
-          </a:lnRef>
-          <a:fillRef idx="1">
-            <a:schemeClr val="accent1"/>
-          </a:fillRef>
-          <a:effectRef idx="0">
-            <a:schemeClr val="accent1"/>
-          </a:effectRef>
-          <a:fontRef idx="minor">
-            <a:schemeClr val="lt1"/>
-          </a:fontRef>
-        </p:style>
-        <p:txBody>
-          <a:bodyPr rtlCol="0" anchor="ctr"/>
-          <a:lstStyle/>
-          <a:p>
-            <a:pPr algn="ctr"/>
-            <a:endParaRPr lang="en-US"/>
-          </a:p>
-        </p:txBody>
-      </p:sp>
-      <p:sp>
-        <p:nvSpPr>
-          <p:cNvPr id="16" name="文本框 15">
-            <a:extLst>
-              <a:ext uri="{FF2B5EF4-FFF2-40B4-BE49-F238E27FC236}">
-                <a16:creationId xmlns:a16="http://schemas.microsoft.com/office/drawing/2014/main" id="{5F05C8E5-84EA-4AC4-B515-98FD4A078EB6}"/>
-              </a:ext>
-            </a:extLst>
-          </p:cNvPr>
-          <p:cNvSpPr txBox="1"/>
-          <p:nvPr/>
-        </p:nvSpPr>
-        <p:spPr>
-          <a:xfrm>
-            <a:off x="2512269" y="1353125"/>
-            <a:ext cx="766335" cy="369332"/>
-          </a:xfrm>
-          <a:prstGeom prst="rect">
-            <a:avLst/>
-          </a:prstGeom>
-          <a:noFill/>
-        </p:spPr>
-        <p:txBody>
-          <a:bodyPr wrap="square" rtlCol="0">
-            <a:spAutoFit/>
-          </a:bodyPr>
-          <a:lstStyle/>
-          <a:p>
-            <a:r>
-              <a:rPr lang="en-US" altLang="zh-CN" dirty="0">
-                <a:solidFill>
-                  <a:schemeClr val="tx1">
-                    <a:lumMod val="85000"/>
-                    <a:lumOff val="15000"/>
-                  </a:schemeClr>
-                </a:solidFill>
-                <a:latin typeface="+mj-lt"/>
-                <a:ea typeface="+mj-ea"/>
-                <a:cs typeface="+mj-cs"/>
-              </a:rPr>
-              <a:t>login</a:t>
-            </a:r>
-            <a:endParaRPr lang="zh-CN" altLang="en-US" dirty="0">
-              <a:solidFill>
-                <a:schemeClr val="tx1">
-                  <a:lumMod val="85000"/>
-                  <a:lumOff val="15000"/>
-                </a:schemeClr>
-              </a:solidFill>
-              <a:latin typeface="+mj-lt"/>
-              <a:ea typeface="+mj-ea"/>
-              <a:cs typeface="+mj-cs"/>
-            </a:endParaRPr>
-          </a:p>
-        </p:txBody>
-      </p:sp>
-      <p:sp>
-        <p:nvSpPr>
-          <p:cNvPr id="17" name="文本框 16">
-            <a:extLst>
-              <a:ext uri="{FF2B5EF4-FFF2-40B4-BE49-F238E27FC236}">
-                <a16:creationId xmlns:a16="http://schemas.microsoft.com/office/drawing/2014/main" id="{87B88508-1B89-44D7-ACAB-B0830A144707}"/>
-              </a:ext>
-            </a:extLst>
-          </p:cNvPr>
-          <p:cNvSpPr txBox="1"/>
-          <p:nvPr/>
-        </p:nvSpPr>
-        <p:spPr>
-          <a:xfrm>
-            <a:off x="2392416" y="2386120"/>
-            <a:ext cx="934458" cy="369332"/>
-          </a:xfrm>
-          <a:prstGeom prst="rect">
-            <a:avLst/>
-          </a:prstGeom>
-          <a:noFill/>
-        </p:spPr>
-        <p:txBody>
-          <a:bodyPr wrap="square" rtlCol="0">
-            <a:spAutoFit/>
-          </a:bodyPr>
-          <a:lstStyle/>
-          <a:p>
-            <a:r>
-              <a:rPr lang="en-US" altLang="zh-CN" dirty="0">
-                <a:solidFill>
-                  <a:schemeClr val="tx1">
-                    <a:lumMod val="85000"/>
-                    <a:lumOff val="15000"/>
-                  </a:schemeClr>
-                </a:solidFill>
-                <a:latin typeface="+mj-lt"/>
-                <a:ea typeface="+mj-ea"/>
-                <a:cs typeface="+mj-cs"/>
-              </a:rPr>
-              <a:t>logout</a:t>
-            </a:r>
-            <a:endParaRPr lang="zh-CN" altLang="en-US" dirty="0">
-              <a:solidFill>
-                <a:schemeClr val="tx1">
-                  <a:lumMod val="85000"/>
-                  <a:lumOff val="15000"/>
-                </a:schemeClr>
-              </a:solidFill>
-              <a:latin typeface="+mj-lt"/>
-              <a:ea typeface="+mj-ea"/>
-              <a:cs typeface="+mj-cs"/>
-            </a:endParaRPr>
-          </a:p>
-        </p:txBody>
-      </p:sp>
-      <p:sp>
-        <p:nvSpPr>
-          <p:cNvPr id="5" name="文本框 4">
-            <a:extLst>
-              <a:ext uri="{FF2B5EF4-FFF2-40B4-BE49-F238E27FC236}">
-                <a16:creationId xmlns:a16="http://schemas.microsoft.com/office/drawing/2014/main" id="{A0E56FF2-C0D5-4A3B-A3BA-24C089D8D780}"/>
-              </a:ext>
-            </a:extLst>
-          </p:cNvPr>
-          <p:cNvSpPr txBox="1"/>
-          <p:nvPr/>
-        </p:nvSpPr>
-        <p:spPr>
-          <a:xfrm>
-            <a:off x="585868" y="2796249"/>
-            <a:ext cx="461665" cy="942900"/>
-          </a:xfrm>
-          <a:prstGeom prst="rect">
-            <a:avLst/>
-          </a:prstGeom>
-          <a:noFill/>
-        </p:spPr>
-        <p:txBody>
-          <a:bodyPr vert="eaVert" wrap="square" rtlCol="0">
-            <a:spAutoFit/>
-          </a:bodyPr>
-          <a:lstStyle/>
-          <a:p>
-            <a:r>
-              <a:rPr lang="en-US" altLang="zh-CN" dirty="0"/>
-              <a:t>register</a:t>
-            </a:r>
-            <a:endParaRPr lang="zh-CN" altLang="en-US" dirty="0"/>
-          </a:p>
-        </p:txBody>
-      </p:sp>
-      <p:sp>
-        <p:nvSpPr>
-          <p:cNvPr id="18" name="Down Arrow 12">
-            <a:extLst>
-              <a:ext uri="{FF2B5EF4-FFF2-40B4-BE49-F238E27FC236}">
-                <a16:creationId xmlns:a16="http://schemas.microsoft.com/office/drawing/2014/main" id="{C9F0D95C-374D-4BD0-B2F3-A3E02D088EAF}"/>
-              </a:ext>
-            </a:extLst>
-          </p:cNvPr>
-          <p:cNvSpPr/>
-          <p:nvPr/>
-        </p:nvSpPr>
-        <p:spPr>
-          <a:xfrm rot="10800000">
-            <a:off x="1355742" y="2916555"/>
-            <a:ext cx="242521" cy="642339"/>
-          </a:xfrm>
-          <a:prstGeom prst="downArrow">
-            <a:avLst/>
-          </a:prstGeom>
-        </p:spPr>
-        <p:style>
-          <a:lnRef idx="2">
-            <a:schemeClr val="accent1">
-              <a:shade val="50000"/>
-            </a:schemeClr>
-          </a:lnRef>
-          <a:fillRef idx="1">
-            <a:schemeClr val="accent1"/>
-          </a:fillRef>
-          <a:effectRef idx="0">
-            <a:schemeClr val="accent1"/>
-          </a:effectRef>
-          <a:fontRef idx="minor">
-            <a:schemeClr val="lt1"/>
-          </a:fontRef>
-        </p:style>
-        <p:txBody>
-          <a:bodyPr rtlCol="0" anchor="ctr"/>
-          <a:lstStyle/>
-          <a:p>
-            <a:pPr algn="ctr"/>
-            <a:endParaRPr lang="en-US"/>
-          </a:p>
-        </p:txBody>
-      </p:sp>
-      <p:sp>
-        <p:nvSpPr>
-          <p:cNvPr id="19" name="文本框 18">
-            <a:extLst>
-              <a:ext uri="{FF2B5EF4-FFF2-40B4-BE49-F238E27FC236}">
-                <a16:creationId xmlns:a16="http://schemas.microsoft.com/office/drawing/2014/main" id="{29F1A42A-9DD7-478A-9C76-78CCD0BEB495}"/>
-              </a:ext>
-            </a:extLst>
-          </p:cNvPr>
-          <p:cNvSpPr txBox="1"/>
-          <p:nvPr/>
-        </p:nvSpPr>
-        <p:spPr>
-          <a:xfrm rot="10800000">
-            <a:off x="1548471" y="2649482"/>
-            <a:ext cx="461665" cy="942900"/>
-          </a:xfrm>
-          <a:prstGeom prst="rect">
-            <a:avLst/>
-          </a:prstGeom>
-          <a:noFill/>
-        </p:spPr>
-        <p:txBody>
-          <a:bodyPr vert="eaVert" wrap="square" rtlCol="0">
-            <a:spAutoFit/>
-          </a:bodyPr>
-          <a:lstStyle/>
-          <a:p>
-            <a:r>
-              <a:rPr lang="en-US" altLang="zh-CN" dirty="0"/>
-              <a:t>Done</a:t>
-            </a:r>
-            <a:endParaRPr lang="zh-CN" altLang="en-US" dirty="0"/>
-          </a:p>
-        </p:txBody>
-      </p:sp>
-      <p:pic>
-        <p:nvPicPr>
-          <p:cNvPr id="8" name="图片 7">
-            <a:extLst>
-              <a:ext uri="{FF2B5EF4-FFF2-40B4-BE49-F238E27FC236}">
-                <a16:creationId xmlns:a16="http://schemas.microsoft.com/office/drawing/2014/main" id="{53BE92F3-4D47-4386-993F-3B850EE1B6F2}"/>
-              </a:ext>
-            </a:extLst>
-          </p:cNvPr>
-          <p:cNvPicPr>
-            <a:picLocks noChangeAspect="1"/>
-          </p:cNvPicPr>
-          <p:nvPr/>
-        </p:nvPicPr>
-        <p:blipFill>
-          <a:blip r:embed="rId5"/>
-          <a:stretch>
-            <a:fillRect/>
-          </a:stretch>
-        </p:blipFill>
-        <p:spPr>
-          <a:xfrm>
-            <a:off x="8114182" y="3155677"/>
-            <a:ext cx="3836723" cy="3594647"/>
-          </a:xfrm>
-          <a:prstGeom prst="roundRect">
-            <a:avLst>
-              <a:gd name="adj" fmla="val 16667"/>
-            </a:avLst>
-          </a:prstGeom>
-          <a:ln>
-            <a:noFill/>
-          </a:ln>
-          <a:effectLst>
-            <a:outerShdw blurRad="152400" dist="12000" dir="900000" sy="98000" kx="110000" ky="200000" algn="tl" rotWithShape="0">
-              <a:srgbClr val="000000">
-                <a:alpha val="30000"/>
-              </a:srgbClr>
-            </a:outerShdw>
-          </a:effectLst>
-          <a:scene3d>
-            <a:camera prst="perspectiveRelaxed">
-              <a:rot lat="19800000" lon="1200000" rev="20820000"/>
-            </a:camera>
-            <a:lightRig rig="threePt" dir="t"/>
-          </a:scene3d>
-          <a:sp3d contourW="6350" prstMaterial="matte">
-            <a:bevelT w="101600" h="101600"/>
-            <a:contourClr>
-              <a:srgbClr val="969696"/>
-            </a:contourClr>
-          </a:sp3d>
-        </p:spPr>
-      </p:pic>
-    </p:spTree>
-    <p:extLst>
-      <p:ext uri="{BB962C8B-B14F-4D97-AF65-F5344CB8AC3E}">
         <p14:creationId xmlns:p14="http://schemas.microsoft.com/office/powerpoint/2010/main" val="2199337654"/>
       </p:ext>
     </p:extLst>
@@ -9205,6 +9426,13 @@
   <p:clrMapOvr>
     <a:masterClrMapping/>
   </p:clrMapOvr>
+  <p:timing>
+    <p:tnLst>
+      <p:par>
+        <p:cTn id="1" dur="indefinite" restart="never" nodeType="tmRoot"/>
+      </p:par>
+    </p:tnLst>
+  </p:timing>
 </p:sld>
 </file>
 
@@ -9269,6 +9497,16 @@
           <a:prstGeom prst="rect">
             <a:avLst/>
           </a:prstGeom>
+          <a:ln>
+            <a:noFill/>
+          </a:ln>
+          <a:effectLst>
+            <a:outerShdw blurRad="292100" dist="139700" dir="2700000" algn="tl" rotWithShape="0">
+              <a:srgbClr val="333333">
+                <a:alpha val="65000"/>
+              </a:srgbClr>
+            </a:outerShdw>
+          </a:effectLst>
         </p:spPr>
       </p:pic>
       <p:sp>
@@ -9373,6 +9611,16 @@
           <a:prstGeom prst="rect">
             <a:avLst/>
           </a:prstGeom>
+          <a:ln>
+            <a:noFill/>
+          </a:ln>
+          <a:effectLst>
+            <a:outerShdw blurRad="190500" algn="tl" rotWithShape="0">
+              <a:srgbClr val="000000">
+                <a:alpha val="70000"/>
+              </a:srgbClr>
+            </a:outerShdw>
+          </a:effectLst>
         </p:spPr>
       </p:pic>
       <p:pic>
@@ -9397,6 +9645,16 @@
           <a:prstGeom prst="rect">
             <a:avLst/>
           </a:prstGeom>
+          <a:ln>
+            <a:noFill/>
+          </a:ln>
+          <a:effectLst>
+            <a:outerShdw blurRad="190500" algn="tl" rotWithShape="0">
+              <a:srgbClr val="000000">
+                <a:alpha val="70000"/>
+              </a:srgbClr>
+            </a:outerShdw>
+          </a:effectLst>
         </p:spPr>
       </p:pic>
     </p:spTree>
@@ -9409,6 +9667,13 @@
   <p:clrMapOvr>
     <a:masterClrMapping/>
   </p:clrMapOvr>
+  <p:timing>
+    <p:tnLst>
+      <p:par>
+        <p:cTn id="1" dur="indefinite" restart="never" nodeType="tmRoot"/>
+      </p:par>
+    </p:tnLst>
+  </p:timing>
 </p:sld>
 </file>
 
@@ -9543,6 +9808,16 @@
           <a:prstGeom prst="rect">
             <a:avLst/>
           </a:prstGeom>
+          <a:ln>
+            <a:noFill/>
+          </a:ln>
+          <a:effectLst>
+            <a:outerShdw blurRad="292100" dist="139700" dir="2700000" algn="tl" rotWithShape="0">
+              <a:srgbClr val="333333">
+                <a:alpha val="65000"/>
+              </a:srgbClr>
+            </a:outerShdw>
+          </a:effectLst>
         </p:spPr>
       </p:pic>
       <p:pic>
@@ -9567,6 +9842,16 @@
           <a:prstGeom prst="rect">
             <a:avLst/>
           </a:prstGeom>
+          <a:ln>
+            <a:noFill/>
+          </a:ln>
+          <a:effectLst>
+            <a:outerShdw blurRad="292100" dist="139700" dir="2700000" algn="tl" rotWithShape="0">
+              <a:srgbClr val="333333">
+                <a:alpha val="65000"/>
+              </a:srgbClr>
+            </a:outerShdw>
+          </a:effectLst>
         </p:spPr>
       </p:pic>
       <p:pic>
@@ -9574,7 +9859,7 @@
           <p:cNvPr id="5" name="图片 4">
             <a:extLst>
               <a:ext uri="{FF2B5EF4-FFF2-40B4-BE49-F238E27FC236}">
-                <a16:creationId xmlns:a16="http://schemas.microsoft.com/office/drawing/2014/main" id="{564FA5E2-4843-4356-9224-96981426775C}"/>
+                <a16:creationId xmlns:a16="http://schemas.microsoft.com/office/drawing/2014/main" xmlns="" id="{564FA5E2-4843-4356-9224-96981426775C}"/>
               </a:ext>
             </a:extLst>
           </p:cNvPr>
@@ -9597,6 +9882,16 @@
           <a:prstGeom prst="rect">
             <a:avLst/>
           </a:prstGeom>
+          <a:ln>
+            <a:noFill/>
+          </a:ln>
+          <a:effectLst>
+            <a:outerShdw blurRad="292100" dist="139700" dir="2700000" algn="tl" rotWithShape="0">
+              <a:srgbClr val="333333">
+                <a:alpha val="65000"/>
+              </a:srgbClr>
+            </a:outerShdw>
+          </a:effectLst>
         </p:spPr>
       </p:pic>
       <p:sp>
@@ -9604,7 +9899,7 @@
           <p:cNvPr id="10" name="左大括号 9">
             <a:extLst>
               <a:ext uri="{FF2B5EF4-FFF2-40B4-BE49-F238E27FC236}">
-                <a16:creationId xmlns:a16="http://schemas.microsoft.com/office/drawing/2014/main" id="{6031B2BE-CE20-4F57-A001-75056E0B0414}"/>
+                <a16:creationId xmlns:a16="http://schemas.microsoft.com/office/drawing/2014/main" xmlns="" id="{6031B2BE-CE20-4F57-A001-75056E0B0414}"/>
               </a:ext>
             </a:extLst>
           </p:cNvPr>
@@ -9653,6 +9948,13 @@
   <p:clrMapOvr>
     <a:masterClrMapping/>
   </p:clrMapOvr>
+  <p:timing>
+    <p:tnLst>
+      <p:par>
+        <p:cTn id="1" dur="indefinite" restart="never" nodeType="tmRoot"/>
+      </p:par>
+    </p:tnLst>
+  </p:timing>
 </p:sld>
 </file>
 
@@ -9785,6 +10087,16 @@
           <a:prstGeom prst="rect">
             <a:avLst/>
           </a:prstGeom>
+          <a:ln>
+            <a:noFill/>
+          </a:ln>
+          <a:effectLst>
+            <a:outerShdw blurRad="292100" dist="139700" dir="2700000" algn="tl" rotWithShape="0">
+              <a:srgbClr val="333333">
+                <a:alpha val="65000"/>
+              </a:srgbClr>
+            </a:outerShdw>
+          </a:effectLst>
         </p:spPr>
       </p:pic>
       <p:pic>
@@ -9792,7 +10104,7 @@
           <p:cNvPr id="8" name="图片 7">
             <a:extLst>
               <a:ext uri="{FF2B5EF4-FFF2-40B4-BE49-F238E27FC236}">
-                <a16:creationId xmlns:a16="http://schemas.microsoft.com/office/drawing/2014/main" id="{9D1EF3EF-B7B5-49B6-B2AF-690C94851846}"/>
+                <a16:creationId xmlns:a16="http://schemas.microsoft.com/office/drawing/2014/main" xmlns="" id="{9D1EF3EF-B7B5-49B6-B2AF-690C94851846}"/>
               </a:ext>
             </a:extLst>
           </p:cNvPr>
@@ -9815,6 +10127,16 @@
           <a:prstGeom prst="rect">
             <a:avLst/>
           </a:prstGeom>
+          <a:ln>
+            <a:noFill/>
+          </a:ln>
+          <a:effectLst>
+            <a:outerShdw blurRad="292100" dist="139700" dir="2700000" algn="tl" rotWithShape="0">
+              <a:srgbClr val="333333">
+                <a:alpha val="65000"/>
+              </a:srgbClr>
+            </a:outerShdw>
+          </a:effectLst>
         </p:spPr>
       </p:pic>
       <p:pic>
@@ -9822,7 +10144,7 @@
           <p:cNvPr id="13" name="图片 12">
             <a:extLst>
               <a:ext uri="{FF2B5EF4-FFF2-40B4-BE49-F238E27FC236}">
-                <a16:creationId xmlns:a16="http://schemas.microsoft.com/office/drawing/2014/main" id="{CEF33D3D-3A67-4942-B09D-17AA3B967D4B}"/>
+                <a16:creationId xmlns:a16="http://schemas.microsoft.com/office/drawing/2014/main" xmlns="" id="{CEF33D3D-3A67-4942-B09D-17AA3B967D4B}"/>
               </a:ext>
             </a:extLst>
           </p:cNvPr>
@@ -9845,6 +10167,16 @@
           <a:prstGeom prst="rect">
             <a:avLst/>
           </a:prstGeom>
+          <a:ln>
+            <a:noFill/>
+          </a:ln>
+          <a:effectLst>
+            <a:outerShdw blurRad="292100" dist="139700" dir="2700000" algn="tl" rotWithShape="0">
+              <a:srgbClr val="333333">
+                <a:alpha val="65000"/>
+              </a:srgbClr>
+            </a:outerShdw>
+          </a:effectLst>
         </p:spPr>
       </p:pic>
       <p:sp>
@@ -9852,7 +10184,7 @@
           <p:cNvPr id="14" name="箭头: 右 13">
             <a:extLst>
               <a:ext uri="{FF2B5EF4-FFF2-40B4-BE49-F238E27FC236}">
-                <a16:creationId xmlns:a16="http://schemas.microsoft.com/office/drawing/2014/main" id="{562C9A7E-89A2-44EA-BC58-D69FE1F42BE9}"/>
+                <a16:creationId xmlns:a16="http://schemas.microsoft.com/office/drawing/2014/main" xmlns="" id="{562C9A7E-89A2-44EA-BC58-D69FE1F42BE9}"/>
               </a:ext>
             </a:extLst>
           </p:cNvPr>
@@ -9898,7 +10230,7 @@
           <p:cNvPr id="15" name="文本框 14">
             <a:extLst>
               <a:ext uri="{FF2B5EF4-FFF2-40B4-BE49-F238E27FC236}">
-                <a16:creationId xmlns:a16="http://schemas.microsoft.com/office/drawing/2014/main" id="{F70FDAAE-E29D-4D6D-A45C-446D6A238C37}"/>
+                <a16:creationId xmlns:a16="http://schemas.microsoft.com/office/drawing/2014/main" xmlns="" id="{F70FDAAE-E29D-4D6D-A45C-446D6A238C37}"/>
               </a:ext>
             </a:extLst>
           </p:cNvPr>
@@ -9968,7 +10300,7 @@
           <p:cNvPr id="16" name="矩形: 圆角 15">
             <a:extLst>
               <a:ext uri="{FF2B5EF4-FFF2-40B4-BE49-F238E27FC236}">
-                <a16:creationId xmlns:a16="http://schemas.microsoft.com/office/drawing/2014/main" id="{59CE5F16-9811-40B6-9FA2-53450AEA0B0F}"/>
+                <a16:creationId xmlns:a16="http://schemas.microsoft.com/office/drawing/2014/main" xmlns="" id="{59CE5F16-9811-40B6-9FA2-53450AEA0B0F}"/>
               </a:ext>
             </a:extLst>
           </p:cNvPr>
@@ -10024,7 +10356,7 @@
           <p:cNvPr id="17" name="箭头: 右 16">
             <a:extLst>
               <a:ext uri="{FF2B5EF4-FFF2-40B4-BE49-F238E27FC236}">
-                <a16:creationId xmlns:a16="http://schemas.microsoft.com/office/drawing/2014/main" id="{B6730BC9-368A-475E-A545-9D5BCC4AF849}"/>
+                <a16:creationId xmlns:a16="http://schemas.microsoft.com/office/drawing/2014/main" xmlns="" id="{B6730BC9-368A-475E-A545-9D5BCC4AF849}"/>
               </a:ext>
             </a:extLst>
           </p:cNvPr>
@@ -10070,7 +10402,7 @@
           <p:cNvPr id="18" name="矩形: 圆角 17">
             <a:extLst>
               <a:ext uri="{FF2B5EF4-FFF2-40B4-BE49-F238E27FC236}">
-                <a16:creationId xmlns:a16="http://schemas.microsoft.com/office/drawing/2014/main" id="{4077E897-407F-43BB-9F30-B235516C2E1A}"/>
+                <a16:creationId xmlns:a16="http://schemas.microsoft.com/office/drawing/2014/main" xmlns="" id="{4077E897-407F-43BB-9F30-B235516C2E1A}"/>
               </a:ext>
             </a:extLst>
           </p:cNvPr>
@@ -10126,7 +10458,7 @@
           <p:cNvPr id="19" name="文本框 18">
             <a:extLst>
               <a:ext uri="{FF2B5EF4-FFF2-40B4-BE49-F238E27FC236}">
-                <a16:creationId xmlns:a16="http://schemas.microsoft.com/office/drawing/2014/main" id="{FFC0ACB1-4894-4649-93B6-19058B57E292}"/>
+                <a16:creationId xmlns:a16="http://schemas.microsoft.com/office/drawing/2014/main" xmlns="" id="{FFC0ACB1-4894-4649-93B6-19058B57E292}"/>
               </a:ext>
             </a:extLst>
           </p:cNvPr>
@@ -10162,7 +10494,7 @@
           <p:cNvPr id="20" name="箭头: 右 19">
             <a:extLst>
               <a:ext uri="{FF2B5EF4-FFF2-40B4-BE49-F238E27FC236}">
-                <a16:creationId xmlns:a16="http://schemas.microsoft.com/office/drawing/2014/main" id="{03159D22-0388-46DC-A9AE-CBDBC298EF47}"/>
+                <a16:creationId xmlns:a16="http://schemas.microsoft.com/office/drawing/2014/main" xmlns="" id="{03159D22-0388-46DC-A9AE-CBDBC298EF47}"/>
               </a:ext>
             </a:extLst>
           </p:cNvPr>
@@ -10208,7 +10540,7 @@
           <p:cNvPr id="21" name="左大括号 20">
             <a:extLst>
               <a:ext uri="{FF2B5EF4-FFF2-40B4-BE49-F238E27FC236}">
-                <a16:creationId xmlns:a16="http://schemas.microsoft.com/office/drawing/2014/main" id="{C9FF0A7A-86BB-4E3E-ABBF-CB0CD350FC6B}"/>
+                <a16:creationId xmlns:a16="http://schemas.microsoft.com/office/drawing/2014/main" xmlns="" id="{C9FF0A7A-86BB-4E3E-ABBF-CB0CD350FC6B}"/>
               </a:ext>
             </a:extLst>
           </p:cNvPr>
@@ -10252,7 +10584,7 @@
           <p:cNvPr id="22" name="矩形: 圆角 21">
             <a:extLst>
               <a:ext uri="{FF2B5EF4-FFF2-40B4-BE49-F238E27FC236}">
-                <a16:creationId xmlns:a16="http://schemas.microsoft.com/office/drawing/2014/main" id="{80502B64-9AA0-42C9-9EDC-85BFF1CE840A}"/>
+                <a16:creationId xmlns:a16="http://schemas.microsoft.com/office/drawing/2014/main" xmlns="" id="{80502B64-9AA0-42C9-9EDC-85BFF1CE840A}"/>
               </a:ext>
             </a:extLst>
           </p:cNvPr>
@@ -10305,6 +10637,13 @@
   <p:clrMapOvr>
     <a:masterClrMapping/>
   </p:clrMapOvr>
+  <p:timing>
+    <p:tnLst>
+      <p:par>
+        <p:cTn id="1" dur="indefinite" restart="never" nodeType="tmRoot"/>
+      </p:par>
+    </p:tnLst>
+  </p:timing>
 </p:sld>
 </file>
 
@@ -10877,6 +11216,16 @@
           <a:prstGeom prst="rect">
             <a:avLst/>
           </a:prstGeom>
+          <a:ln>
+            <a:noFill/>
+          </a:ln>
+          <a:effectLst>
+            <a:outerShdw blurRad="292100" dist="139700" dir="2700000" algn="tl" rotWithShape="0">
+              <a:srgbClr val="333333">
+                <a:alpha val="65000"/>
+              </a:srgbClr>
+            </a:outerShdw>
+          </a:effectLst>
         </p:spPr>
       </p:pic>
       <p:sp>
@@ -11374,6 +11723,16 @@
           <a:prstGeom prst="rect">
             <a:avLst/>
           </a:prstGeom>
+          <a:ln>
+            <a:noFill/>
+          </a:ln>
+          <a:effectLst>
+            <a:outerShdw blurRad="292100" dist="139700" dir="2700000" algn="tl" rotWithShape="0">
+              <a:srgbClr val="333333">
+                <a:alpha val="65000"/>
+              </a:srgbClr>
+            </a:outerShdw>
+          </a:effectLst>
         </p:spPr>
       </p:pic>
       <p:pic>
@@ -11438,6 +11797,16 @@
           <a:prstGeom prst="rect">
             <a:avLst/>
           </a:prstGeom>
+          <a:ln>
+            <a:noFill/>
+          </a:ln>
+          <a:effectLst>
+            <a:outerShdw blurRad="292100" dist="139700" dir="2700000" algn="tl" rotWithShape="0">
+              <a:srgbClr val="333333">
+                <a:alpha val="65000"/>
+              </a:srgbClr>
+            </a:outerShdw>
+          </a:effectLst>
         </p:spPr>
       </p:pic>
     </p:spTree>
@@ -11450,6 +11819,13 @@
   <p:clrMapOvr>
     <a:masterClrMapping/>
   </p:clrMapOvr>
+  <p:timing>
+    <p:tnLst>
+      <p:par>
+        <p:cTn id="1" dur="indefinite" restart="never" nodeType="tmRoot"/>
+      </p:par>
+    </p:tnLst>
+  </p:timing>
 </p:sld>
 </file>
 
@@ -11546,6 +11922,16 @@
           <a:prstGeom prst="rect">
             <a:avLst/>
           </a:prstGeom>
+          <a:ln>
+            <a:noFill/>
+          </a:ln>
+          <a:effectLst>
+            <a:outerShdw blurRad="292100" dist="139700" dir="2700000" algn="tl" rotWithShape="0">
+              <a:srgbClr val="333333">
+                <a:alpha val="65000"/>
+              </a:srgbClr>
+            </a:outerShdw>
+          </a:effectLst>
         </p:spPr>
       </p:pic>
       <p:pic>
@@ -11553,7 +11939,7 @@
           <p:cNvPr id="7" name="图片 6">
             <a:extLst>
               <a:ext uri="{FF2B5EF4-FFF2-40B4-BE49-F238E27FC236}">
-                <a16:creationId xmlns:a16="http://schemas.microsoft.com/office/drawing/2014/main" id="{8DB51A2B-DC88-4540-97D4-082C8B65C6C5}"/>
+                <a16:creationId xmlns:a16="http://schemas.microsoft.com/office/drawing/2014/main" xmlns="" id="{8DB51A2B-DC88-4540-97D4-082C8B65C6C5}"/>
               </a:ext>
             </a:extLst>
           </p:cNvPr>
@@ -11576,6 +11962,16 @@
           <a:prstGeom prst="rect">
             <a:avLst/>
           </a:prstGeom>
+          <a:ln>
+            <a:noFill/>
+          </a:ln>
+          <a:effectLst>
+            <a:outerShdw blurRad="292100" dist="139700" dir="2700000" algn="tl" rotWithShape="0">
+              <a:srgbClr val="333333">
+                <a:alpha val="65000"/>
+              </a:srgbClr>
+            </a:outerShdw>
+          </a:effectLst>
         </p:spPr>
       </p:pic>
       <p:pic>
@@ -11583,7 +11979,7 @@
           <p:cNvPr id="12" name="图片 11">
             <a:extLst>
               <a:ext uri="{FF2B5EF4-FFF2-40B4-BE49-F238E27FC236}">
-                <a16:creationId xmlns:a16="http://schemas.microsoft.com/office/drawing/2014/main" id="{0E15B9A2-0585-4082-89B3-8E65E76BCA0D}"/>
+                <a16:creationId xmlns:a16="http://schemas.microsoft.com/office/drawing/2014/main" xmlns="" id="{0E15B9A2-0585-4082-89B3-8E65E76BCA0D}"/>
               </a:ext>
             </a:extLst>
           </p:cNvPr>
@@ -11606,6 +12002,16 @@
           <a:prstGeom prst="rect">
             <a:avLst/>
           </a:prstGeom>
+          <a:ln>
+            <a:noFill/>
+          </a:ln>
+          <a:effectLst>
+            <a:outerShdw blurRad="292100" dist="139700" dir="2700000" algn="tl" rotWithShape="0">
+              <a:srgbClr val="333333">
+                <a:alpha val="65000"/>
+              </a:srgbClr>
+            </a:outerShdw>
+          </a:effectLst>
         </p:spPr>
       </p:pic>
     </p:spTree>
@@ -11618,6 +12024,13 @@
   <p:clrMapOvr>
     <a:masterClrMapping/>
   </p:clrMapOvr>
+  <p:timing>
+    <p:tnLst>
+      <p:par>
+        <p:cTn id="1" dur="indefinite" restart="never" nodeType="tmRoot"/>
+      </p:par>
+    </p:tnLst>
+  </p:timing>
 </p:sld>
 </file>
 
@@ -11862,4 +12275,265 @@
     </a:ext>
   </a:extLst>
 </a:theme>
+</file>
+
+<file path=ppt/theme/theme2.xml><?xml version="1.0" encoding="utf-8"?>
+<a:theme xmlns:a="http://schemas.openxmlformats.org/drawingml/2006/main" name="Office Theme">
+  <a:themeElements>
+    <a:clrScheme name="Office">
+      <a:dk1>
+        <a:sysClr val="windowText" lastClr="000000"/>
+      </a:dk1>
+      <a:lt1>
+        <a:sysClr val="window" lastClr="FFFFFF"/>
+      </a:lt1>
+      <a:dk2>
+        <a:srgbClr val="44546A"/>
+      </a:dk2>
+      <a:lt2>
+        <a:srgbClr val="E7E6E6"/>
+      </a:lt2>
+      <a:accent1>
+        <a:srgbClr val="5B9BD5"/>
+      </a:accent1>
+      <a:accent2>
+        <a:srgbClr val="ED7D31"/>
+      </a:accent2>
+      <a:accent3>
+        <a:srgbClr val="A5A5A5"/>
+      </a:accent3>
+      <a:accent4>
+        <a:srgbClr val="FFC000"/>
+      </a:accent4>
+      <a:accent5>
+        <a:srgbClr val="4472C4"/>
+      </a:accent5>
+      <a:accent6>
+        <a:srgbClr val="70AD47"/>
+      </a:accent6>
+      <a:hlink>
+        <a:srgbClr val="0563C1"/>
+      </a:hlink>
+      <a:folHlink>
+        <a:srgbClr val="954F72"/>
+      </a:folHlink>
+    </a:clrScheme>
+    <a:fontScheme name="Office">
+      <a:majorFont>
+        <a:latin typeface="Calibri Light" panose="020F0302020204030204"/>
+        <a:ea typeface=""/>
+        <a:cs typeface=""/>
+        <a:font script="Jpan" typeface="ＭＳ Ｐゴシック"/>
+        <a:font script="Hang" typeface="맑은 고딕"/>
+        <a:font script="Hans" typeface="宋体"/>
+        <a:font script="Hant" typeface="新細明體"/>
+        <a:font script="Arab" typeface="Times New Roman"/>
+        <a:font script="Hebr" typeface="Times New Roman"/>
+        <a:font script="Thai" typeface="Angsana New"/>
+        <a:font script="Ethi" typeface="Nyala"/>
+        <a:font script="Beng" typeface="Vrinda"/>
+        <a:font script="Gujr" typeface="Shruti"/>
+        <a:font script="Khmr" typeface="MoolBoran"/>
+        <a:font script="Knda" typeface="Tunga"/>
+        <a:font script="Guru" typeface="Raavi"/>
+        <a:font script="Cans" typeface="Euphemia"/>
+        <a:font script="Cher" typeface="Plantagenet Cherokee"/>
+        <a:font script="Yiii" typeface="Microsoft Yi Baiti"/>
+        <a:font script="Tibt" typeface="Microsoft Himalaya"/>
+        <a:font script="Thaa" typeface="MV Boli"/>
+        <a:font script="Deva" typeface="Mangal"/>
+        <a:font script="Telu" typeface="Gautami"/>
+        <a:font script="Taml" typeface="Latha"/>
+        <a:font script="Syrc" typeface="Estrangelo Edessa"/>
+        <a:font script="Orya" typeface="Kalinga"/>
+        <a:font script="Mlym" typeface="Kartika"/>
+        <a:font script="Laoo" typeface="DokChampa"/>
+        <a:font script="Sinh" typeface="Iskoola Pota"/>
+        <a:font script="Mong" typeface="Mongolian Baiti"/>
+        <a:font script="Viet" typeface="Times New Roman"/>
+        <a:font script="Uigh" typeface="Microsoft Uighur"/>
+        <a:font script="Geor" typeface="Sylfaen"/>
+      </a:majorFont>
+      <a:minorFont>
+        <a:latin typeface="Calibri" panose="020F0502020204030204"/>
+        <a:ea typeface=""/>
+        <a:cs typeface=""/>
+        <a:font script="Jpan" typeface="ＭＳ Ｐゴシック"/>
+        <a:font script="Hang" typeface="맑은 고딕"/>
+        <a:font script="Hans" typeface="宋体"/>
+        <a:font script="Hant" typeface="新細明體"/>
+        <a:font script="Arab" typeface="Arial"/>
+        <a:font script="Hebr" typeface="Arial"/>
+        <a:font script="Thai" typeface="Cordia New"/>
+        <a:font script="Ethi" typeface="Nyala"/>
+        <a:font script="Beng" typeface="Vrinda"/>
+        <a:font script="Gujr" typeface="Shruti"/>
+        <a:font script="Khmr" typeface="DaunPenh"/>
+        <a:font script="Knda" typeface="Tunga"/>
+        <a:font script="Guru" typeface="Raavi"/>
+        <a:font script="Cans" typeface="Euphemia"/>
+        <a:font script="Cher" typeface="Plantagenet Cherokee"/>
+        <a:font script="Yiii" typeface="Microsoft Yi Baiti"/>
+        <a:font script="Tibt" typeface="Microsoft Himalaya"/>
+        <a:font script="Thaa" typeface="MV Boli"/>
+        <a:font script="Deva" typeface="Mangal"/>
+        <a:font script="Telu" typeface="Gautami"/>
+        <a:font script="Taml" typeface="Latha"/>
+        <a:font script="Syrc" typeface="Estrangelo Edessa"/>
+        <a:font script="Orya" typeface="Kalinga"/>
+        <a:font script="Mlym" typeface="Kartika"/>
+        <a:font script="Laoo" typeface="DokChampa"/>
+        <a:font script="Sinh" typeface="Iskoola Pota"/>
+        <a:font script="Mong" typeface="Mongolian Baiti"/>
+        <a:font script="Viet" typeface="Arial"/>
+        <a:font script="Uigh" typeface="Microsoft Uighur"/>
+        <a:font script="Geor" typeface="Sylfaen"/>
+      </a:minorFont>
+    </a:fontScheme>
+    <a:fmtScheme name="Office">
+      <a:fillStyleLst>
+        <a:solidFill>
+          <a:schemeClr val="phClr"/>
+        </a:solidFill>
+        <a:gradFill rotWithShape="1">
+          <a:gsLst>
+            <a:gs pos="0">
+              <a:schemeClr val="phClr">
+                <a:lumMod val="110000"/>
+                <a:satMod val="105000"/>
+                <a:tint val="67000"/>
+              </a:schemeClr>
+            </a:gs>
+            <a:gs pos="50000">
+              <a:schemeClr val="phClr">
+                <a:lumMod val="105000"/>
+                <a:satMod val="103000"/>
+                <a:tint val="73000"/>
+              </a:schemeClr>
+            </a:gs>
+            <a:gs pos="100000">
+              <a:schemeClr val="phClr">
+                <a:lumMod val="105000"/>
+                <a:satMod val="109000"/>
+                <a:tint val="81000"/>
+              </a:schemeClr>
+            </a:gs>
+          </a:gsLst>
+          <a:lin ang="5400000" scaled="0"/>
+        </a:gradFill>
+        <a:gradFill rotWithShape="1">
+          <a:gsLst>
+            <a:gs pos="0">
+              <a:schemeClr val="phClr">
+                <a:satMod val="103000"/>
+                <a:lumMod val="102000"/>
+                <a:tint val="94000"/>
+              </a:schemeClr>
+            </a:gs>
+            <a:gs pos="50000">
+              <a:schemeClr val="phClr">
+                <a:satMod val="110000"/>
+                <a:lumMod val="100000"/>
+                <a:shade val="100000"/>
+              </a:schemeClr>
+            </a:gs>
+            <a:gs pos="100000">
+              <a:schemeClr val="phClr">
+                <a:lumMod val="99000"/>
+                <a:satMod val="120000"/>
+                <a:shade val="78000"/>
+              </a:schemeClr>
+            </a:gs>
+          </a:gsLst>
+          <a:lin ang="5400000" scaled="0"/>
+        </a:gradFill>
+      </a:fillStyleLst>
+      <a:lnStyleLst>
+        <a:ln w="6350" cap="flat" cmpd="sng" algn="ctr">
+          <a:solidFill>
+            <a:schemeClr val="phClr"/>
+          </a:solidFill>
+          <a:prstDash val="solid"/>
+          <a:miter lim="800000"/>
+        </a:ln>
+        <a:ln w="12700" cap="flat" cmpd="sng" algn="ctr">
+          <a:solidFill>
+            <a:schemeClr val="phClr"/>
+          </a:solidFill>
+          <a:prstDash val="solid"/>
+          <a:miter lim="800000"/>
+        </a:ln>
+        <a:ln w="19050" cap="flat" cmpd="sng" algn="ctr">
+          <a:solidFill>
+            <a:schemeClr val="phClr"/>
+          </a:solidFill>
+          <a:prstDash val="solid"/>
+          <a:miter lim="800000"/>
+        </a:ln>
+      </a:lnStyleLst>
+      <a:effectStyleLst>
+        <a:effectStyle>
+          <a:effectLst/>
+        </a:effectStyle>
+        <a:effectStyle>
+          <a:effectLst/>
+        </a:effectStyle>
+        <a:effectStyle>
+          <a:effectLst>
+            <a:outerShdw blurRad="57150" dist="19050" dir="5400000" algn="ctr" rotWithShape="0">
+              <a:srgbClr val="000000">
+                <a:alpha val="63000"/>
+              </a:srgbClr>
+            </a:outerShdw>
+          </a:effectLst>
+        </a:effectStyle>
+      </a:effectStyleLst>
+      <a:bgFillStyleLst>
+        <a:solidFill>
+          <a:schemeClr val="phClr"/>
+        </a:solidFill>
+        <a:solidFill>
+          <a:schemeClr val="phClr">
+            <a:tint val="95000"/>
+            <a:satMod val="170000"/>
+          </a:schemeClr>
+        </a:solidFill>
+        <a:gradFill rotWithShape="1">
+          <a:gsLst>
+            <a:gs pos="0">
+              <a:schemeClr val="phClr">
+                <a:tint val="93000"/>
+                <a:satMod val="150000"/>
+                <a:shade val="98000"/>
+                <a:lumMod val="102000"/>
+              </a:schemeClr>
+            </a:gs>
+            <a:gs pos="50000">
+              <a:schemeClr val="phClr">
+                <a:tint val="98000"/>
+                <a:satMod val="130000"/>
+                <a:shade val="90000"/>
+                <a:lumMod val="103000"/>
+              </a:schemeClr>
+            </a:gs>
+            <a:gs pos="100000">
+              <a:schemeClr val="phClr">
+                <a:shade val="63000"/>
+                <a:satMod val="120000"/>
+              </a:schemeClr>
+            </a:gs>
+          </a:gsLst>
+          <a:lin ang="5400000" scaled="0"/>
+        </a:gradFill>
+      </a:bgFillStyleLst>
+    </a:fmtScheme>
+  </a:themeElements>
+  <a:objectDefaults/>
+  <a:extraClrSchemeLst/>
+  <a:extLst>
+    <a:ext uri="{05A4C25C-085E-4340-85A3-A5531E510DB2}">
+      <thm15:themeFamily xmlns:thm15="http://schemas.microsoft.com/office/thememl/2012/main" name="Office Theme" id="{62F939B6-93AF-4DB8-9C6B-D6C7DFDC589F}" vid="{4A3C46E8-61CC-4603-A589-7422A47A8E4A}"/>
+    </a:ext>
+  </a:extLst>
+</a:theme>
 </file>
</xml_diff>